<commit_message>
kleine aenderungen dies das ananas
</commit_message>
<xml_diff>
--- a/Praesentation/Nationale und internationale Datenschutzregelungen in sozialen Netzwerken.pptx
+++ b/Praesentation/Nationale und internationale Datenschutzregelungen in sozialen Netzwerken.pptx
@@ -217,7 +217,7 @@
           <a:p>
             <a:fld id="{D77838FB-1134-4055-835C-8DBE3EF86E9E}" type="datetimeFigureOut">
               <a:rPr lang="de-DE" smtClean="0"/>
-              <a:t>30.06.2017</a:t>
+              <a:t>06.07.2017</a:t>
             </a:fld>
             <a:endParaRPr lang="de-DE"/>
           </a:p>
@@ -1606,6 +1606,30 @@
           <a:bodyPr/>
           <a:lstStyle/>
           <a:p>
+            <a:pPr marL="171450" marR="0" lvl="0" indent="-171450" algn="l" defTabSz="914400" rtl="0" eaLnBrk="1" fontAlgn="auto" latinLnBrk="0" hangingPunct="1">
+              <a:lnSpc>
+                <a:spcPct val="100000"/>
+              </a:lnSpc>
+              <a:spcBef>
+                <a:spcPts val="0"/>
+              </a:spcBef>
+              <a:spcAft>
+                <a:spcPts val="0"/>
+              </a:spcAft>
+              <a:buClrTx/>
+              <a:buSzTx/>
+              <a:buFont typeface="Arial" panose="020B0604020202020204" pitchFamily="34" charset="0"/>
+              <a:buChar char="•"/>
+              <a:tabLst/>
+              <a:defRPr/>
+            </a:pPr>
+            <a:r>
+              <a:rPr lang="de-DE" dirty="0"/>
+              <a:t>Kontakte und Online-Status fallen weg</a:t>
+            </a:r>
+            <a:endParaRPr lang="de-DE" dirty="0"/>
+          </a:p>
+          <a:p>
             <a:pPr marL="171450" indent="-171450">
               <a:buFont typeface="Arial" panose="020B0604020202020204" pitchFamily="34" charset="0"/>
               <a:buChar char="•"/>
@@ -1627,16 +1651,6 @@
               <a:t>…</a:t>
             </a:r>
             <a:endParaRPr lang="de-DE" dirty="0"/>
-          </a:p>
-          <a:p>
-            <a:pPr marL="171450" indent="-171450">
-              <a:buFont typeface="Arial" panose="020B0604020202020204" pitchFamily="34" charset="0"/>
-              <a:buChar char="•"/>
-            </a:pPr>
-            <a:r>
-              <a:rPr lang="de-DE" dirty="0"/>
-              <a:t>Kontakte und Online-Status fallen weg</a:t>
-            </a:r>
           </a:p>
           <a:p>
             <a:pPr marL="171450" indent="-171450">
@@ -2482,7 +2496,7 @@
           <a:p>
             <a:fld id="{0A362FFA-F068-4CE5-B8E9-C604EFE1FA7E}" type="datetime1">
               <a:rPr lang="en-GB" smtClean="0"/>
-              <a:t>30/06/2017</a:t>
+              <a:t>06/07/2017</a:t>
             </a:fld>
             <a:endParaRPr lang="en-GB"/>
           </a:p>
@@ -2820,7 +2834,7 @@
           <a:p>
             <a:fld id="{419ABAD7-0B03-4178-AFEE-067DAD1C2F24}" type="datetime1">
               <a:rPr lang="en-GB" smtClean="0"/>
-              <a:t>30/06/2017</a:t>
+              <a:t>06/07/2017</a:t>
             </a:fld>
             <a:endParaRPr lang="en-GB"/>
           </a:p>
@@ -3221,7 +3235,7 @@
           <a:p>
             <a:fld id="{6639631F-6DD7-43A3-AAD9-F4F03DBC9B43}" type="datetime1">
               <a:rPr lang="en-GB" smtClean="0"/>
-              <a:t>30/06/2017</a:t>
+              <a:t>06/07/2017</a:t>
             </a:fld>
             <a:endParaRPr lang="en-GB"/>
           </a:p>
@@ -3557,7 +3571,7 @@
           <a:p>
             <a:fld id="{11717C61-26AB-4487-BCED-53B78FEE2676}" type="datetime1">
               <a:rPr lang="en-GB" smtClean="0"/>
-              <a:t>30/06/2017</a:t>
+              <a:t>06/07/2017</a:t>
             </a:fld>
             <a:endParaRPr lang="en-GB"/>
           </a:p>
@@ -3877,7 +3891,7 @@
           <a:p>
             <a:fld id="{733C177C-45E7-4F76-80F0-DD274A24026D}" type="datetime1">
               <a:rPr lang="en-GB" smtClean="0"/>
-              <a:t>30/06/2017</a:t>
+              <a:t>06/07/2017</a:t>
             </a:fld>
             <a:endParaRPr lang="en-GB"/>
           </a:p>
@@ -4273,7 +4287,7 @@
           <a:p>
             <a:fld id="{A75A69B5-ADDD-4979-9E19-17B69CBAAC0E}" type="datetime1">
               <a:rPr lang="en-GB" smtClean="0"/>
-              <a:t>30/06/2017</a:t>
+              <a:t>06/07/2017</a:t>
             </a:fld>
             <a:endParaRPr lang="en-GB"/>
           </a:p>
@@ -4530,7 +4544,7 @@
           <a:p>
             <a:fld id="{D7A491A0-9928-485F-91B1-BD2845A1F35B}" type="datetime1">
               <a:rPr lang="en-GB" smtClean="0"/>
-              <a:t>30/06/2017</a:t>
+              <a:t>06/07/2017</a:t>
             </a:fld>
             <a:endParaRPr lang="en-GB"/>
           </a:p>
@@ -4792,7 +4806,7 @@
           <a:p>
             <a:fld id="{A63D741D-3236-48EF-BBCF-534C0B4BC893}" type="datetime1">
               <a:rPr lang="en-GB" smtClean="0"/>
-              <a:t>30/06/2017</a:t>
+              <a:t>06/07/2017</a:t>
             </a:fld>
             <a:endParaRPr lang="en-GB"/>
           </a:p>
@@ -5054,7 +5068,7 @@
           <a:p>
             <a:fld id="{1E861F9F-16F7-4935-BF48-5B94A0812D7E}" type="datetime1">
               <a:rPr lang="en-GB" smtClean="0"/>
-              <a:t>30/06/2017</a:t>
+              <a:t>06/07/2017</a:t>
             </a:fld>
             <a:endParaRPr lang="en-GB"/>
           </a:p>
@@ -5383,7 +5397,7 @@
           <a:p>
             <a:fld id="{1EF3604A-F262-4919-96C1-C92C2CFD9075}" type="datetime1">
               <a:rPr lang="en-GB" smtClean="0"/>
-              <a:t>30/06/2017</a:t>
+              <a:t>06/07/2017</a:t>
             </a:fld>
             <a:endParaRPr lang="en-GB"/>
           </a:p>
@@ -5706,7 +5720,7 @@
           <a:p>
             <a:fld id="{00D6BC72-D918-44B0-88EE-9E06E37F3BE0}" type="datetime1">
               <a:rPr lang="en-GB" smtClean="0"/>
-              <a:t>30/06/2017</a:t>
+              <a:t>06/07/2017</a:t>
             </a:fld>
             <a:endParaRPr lang="en-GB"/>
           </a:p>
@@ -6163,7 +6177,7 @@
           <a:p>
             <a:fld id="{2D84871C-1621-48BD-8259-D515F7C09BDA}" type="datetime1">
               <a:rPr lang="en-GB" smtClean="0"/>
-              <a:t>30/06/2017</a:t>
+              <a:t>06/07/2017</a:t>
             </a:fld>
             <a:endParaRPr lang="en-GB"/>
           </a:p>
@@ -6368,7 +6382,7 @@
           <a:p>
             <a:fld id="{9569CF5A-8160-4BFA-B01D-1460FAD37F64}" type="datetime1">
               <a:rPr lang="en-GB" smtClean="0"/>
-              <a:t>30/06/2017</a:t>
+              <a:t>06/07/2017</a:t>
             </a:fld>
             <a:endParaRPr lang="en-GB"/>
           </a:p>
@@ -6545,7 +6559,7 @@
           <a:p>
             <a:fld id="{D7A0482C-C235-40F3-94D1-C7C297AE0950}" type="datetime1">
               <a:rPr lang="en-GB" smtClean="0"/>
-              <a:t>30/06/2017</a:t>
+              <a:t>06/07/2017</a:t>
             </a:fld>
             <a:endParaRPr lang="en-GB"/>
           </a:p>
@@ -6878,7 +6892,7 @@
           <a:p>
             <a:fld id="{C9D8BFA3-CC49-4094-A56E-74604C7D9375}" type="datetime1">
               <a:rPr lang="en-GB" smtClean="0"/>
-              <a:t>30/06/2017</a:t>
+              <a:t>06/07/2017</a:t>
             </a:fld>
             <a:endParaRPr lang="en-GB"/>
           </a:p>
@@ -7223,7 +7237,7 @@
           <a:p>
             <a:fld id="{C1D9875B-6434-4D0B-8A36-FEA09A58C0F1}" type="datetime1">
               <a:rPr lang="en-GB" smtClean="0"/>
-              <a:t>30/06/2017</a:t>
+              <a:t>06/07/2017</a:t>
             </a:fld>
             <a:endParaRPr lang="en-GB"/>
           </a:p>
@@ -9340,7 +9354,7 @@
           <a:p>
             <a:fld id="{C9E58BE4-BE4C-4D17-A95E-D7E98A02E69C}" type="datetime1">
               <a:rPr lang="en-GB" smtClean="0"/>
-              <a:t>30/06/2017</a:t>
+              <a:t>06/07/2017</a:t>
             </a:fld>
             <a:endParaRPr lang="en-GB"/>
           </a:p>
@@ -9937,7 +9951,7 @@
           <a:p>
             <a:fld id="{68C2C608-4C39-499F-B14E-68000BDEBE0A}" type="datetime1">
               <a:rPr lang="en-GB" smtClean="0"/>
-              <a:t>30/06/2017</a:t>
+              <a:t>06/07/2017</a:t>
             </a:fld>
             <a:endParaRPr lang="en-GB"/>
           </a:p>
@@ -10038,12 +10052,22 @@
               <a:rPr lang="de-DE" dirty="0"/>
               <a:t>Anzeige von maßgeschneiderten Inhalten &amp; Werbung</a:t>
             </a:r>
+            <a:r>
+              <a:rPr lang="de-DE" dirty="0"/>
+              <a:t> (Facebook &amp; Twitter)</a:t>
+            </a:r>
+            <a:endParaRPr lang="de-DE" dirty="0"/>
           </a:p>
           <a:p>
             <a:r>
               <a:rPr lang="de-DE" dirty="0"/>
               <a:t>Anzeige von standortabhängige Inhalten &amp; Werbung</a:t>
             </a:r>
+            <a:r>
+              <a:rPr lang="de-DE" dirty="0"/>
+              <a:t> (Facebook &amp; Twitter)</a:t>
+            </a:r>
+            <a:endParaRPr lang="de-DE" dirty="0"/>
           </a:p>
           <a:p>
             <a:r>
@@ -10070,7 +10094,7 @@
           <a:p>
             <a:fld id="{7F93199A-F302-49A2-B177-BCB91B6840D3}" type="datetime1">
               <a:rPr lang="en-GB" smtClean="0"/>
-              <a:t>30/06/2017</a:t>
+              <a:t>06/07/2017</a:t>
             </a:fld>
             <a:endParaRPr lang="en-GB"/>
           </a:p>
@@ -10563,7 +10587,7 @@
           <a:p>
             <a:fld id="{CDB9903B-4980-4A1D-911F-7F8F7C33A65E}" type="datetime1">
               <a:rPr lang="en-GB" smtClean="0"/>
-              <a:t>30/06/2017</a:t>
+              <a:t>06/07/2017</a:t>
             </a:fld>
             <a:endParaRPr lang="en-GB"/>
           </a:p>
@@ -10704,7 +10728,7 @@
           <a:p>
             <a:fld id="{7C7A0083-4847-43E0-BDE3-F4301945893B}" type="datetime1">
               <a:rPr lang="en-GB" smtClean="0"/>
-              <a:t>30/06/2017</a:t>
+              <a:t>06/07/2017</a:t>
             </a:fld>
             <a:endParaRPr lang="en-GB"/>
           </a:p>
@@ -10934,7 +10958,7 @@
           <a:p>
             <a:fld id="{B9A60C60-704D-42DC-B506-EA418CEAACBA}" type="datetime1">
               <a:rPr lang="en-GB" smtClean="0"/>
-              <a:t>30/06/2017</a:t>
+              <a:t>06/07/2017</a:t>
             </a:fld>
             <a:endParaRPr lang="en-GB"/>
           </a:p>
@@ -10960,6 +10984,64 @@
               <a:t>13</a:t>
             </a:fld>
             <a:endParaRPr lang="en-GB"/>
+          </a:p>
+        </p:txBody>
+      </p:sp>
+      <p:sp>
+        <p:nvSpPr>
+          <p:cNvPr id="5" name="Textfeld 4"/>
+          <p:cNvSpPr txBox="1"/>
+          <p:nvPr/>
+        </p:nvSpPr>
+        <p:spPr>
+          <a:xfrm>
+            <a:off x="2926428" y="2781493"/>
+            <a:ext cx="1854995" cy="369332"/>
+          </a:xfrm>
+          <a:prstGeom prst="rect">
+            <a:avLst/>
+          </a:prstGeom>
+          <a:noFill/>
+        </p:spPr>
+        <p:txBody>
+          <a:bodyPr wrap="none" rtlCol="0">
+            <a:spAutoFit/>
+          </a:bodyPr>
+          <a:lstStyle/>
+          <a:p>
+            <a:r>
+              <a:rPr lang="de-DE" dirty="0"/>
+              <a:t>Prüfungsstufe 1</a:t>
+            </a:r>
+          </a:p>
+        </p:txBody>
+      </p:sp>
+      <p:sp>
+        <p:nvSpPr>
+          <p:cNvPr id="9" name="Textfeld 8"/>
+          <p:cNvSpPr txBox="1"/>
+          <p:nvPr/>
+        </p:nvSpPr>
+        <p:spPr>
+          <a:xfrm>
+            <a:off x="8460451" y="2781493"/>
+            <a:ext cx="1854995" cy="369332"/>
+          </a:xfrm>
+          <a:prstGeom prst="rect">
+            <a:avLst/>
+          </a:prstGeom>
+          <a:noFill/>
+        </p:spPr>
+        <p:txBody>
+          <a:bodyPr wrap="none" rtlCol="0">
+            <a:spAutoFit/>
+          </a:bodyPr>
+          <a:lstStyle/>
+          <a:p>
+            <a:r>
+              <a:rPr lang="de-DE" dirty="0"/>
+              <a:t>Prüfungsstufe 2</a:t>
+            </a:r>
           </a:p>
         </p:txBody>
       </p:sp>
@@ -11047,6 +11129,33 @@
                                   </p:childTnLst>
                                 </p:cTn>
                               </p:par>
+                              <p:par>
+                                <p:cTn id="9" presetID="1" presetClass="entr" presetSubtype="0" fill="hold" grpId="0" nodeType="withEffect">
+                                  <p:stCondLst>
+                                    <p:cond delay="0"/>
+                                  </p:stCondLst>
+                                  <p:childTnLst>
+                                    <p:set>
+                                      <p:cBhvr>
+                                        <p:cTn id="10" dur="1" fill="hold">
+                                          <p:stCondLst>
+                                            <p:cond delay="0"/>
+                                          </p:stCondLst>
+                                        </p:cTn>
+                                        <p:tgtEl>
+                                          <p:spTgt spid="9"/>
+                                        </p:tgtEl>
+                                        <p:attrNameLst>
+                                          <p:attrName>style.visibility</p:attrName>
+                                        </p:attrNameLst>
+                                      </p:cBhvr>
+                                      <p:to>
+                                        <p:strVal val="visible"/>
+                                      </p:to>
+                                    </p:set>
+                                  </p:childTnLst>
+                                </p:cTn>
+                              </p:par>
                             </p:childTnLst>
                           </p:cTn>
                         </p:par>
@@ -11076,6 +11185,7 @@
     </p:tnLst>
     <p:bldLst>
       <p:bldP spid="6" grpId="0" animBg="1"/>
+      <p:bldP spid="9" grpId="0"/>
     </p:bldLst>
   </p:timing>
 </p:sld>
@@ -11213,7 +11323,7 @@
           <a:p>
             <a:fld id="{086F0895-350C-4319-9A99-EB7EA0C1D7AE}" type="datetime1">
               <a:rPr lang="en-GB" smtClean="0"/>
-              <a:t>30/06/2017</a:t>
+              <a:t>06/07/2017</a:t>
             </a:fld>
             <a:endParaRPr lang="en-GB"/>
           </a:p>
@@ -11463,7 +11573,7 @@
           <a:p>
             <a:fld id="{428B0CFC-297E-401F-999F-9E6D4DC783D9}" type="datetime1">
               <a:rPr lang="en-GB" smtClean="0"/>
-              <a:t>30/06/2017</a:t>
+              <a:t>06/07/2017</a:t>
             </a:fld>
             <a:endParaRPr lang="en-GB"/>
           </a:p>
@@ -11838,7 +11948,7 @@
           <a:p>
             <a:fld id="{22D93F98-2C5F-4608-9E05-015046598447}" type="datetime1">
               <a:rPr lang="en-GB" smtClean="0"/>
-              <a:t>30/06/2017</a:t>
+              <a:t>06/07/2017</a:t>
             </a:fld>
             <a:endParaRPr lang="en-GB"/>
           </a:p>
@@ -12294,7 +12404,7 @@
           <a:p>
             <a:fld id="{AA464A36-8C49-4EF5-9E35-A0C7D8EEEB2A}" type="datetime1">
               <a:rPr lang="en-GB" smtClean="0"/>
-              <a:t>30/06/2017</a:t>
+              <a:t>06/07/2017</a:t>
             </a:fld>
             <a:endParaRPr lang="en-GB"/>
           </a:p>
@@ -13152,7 +13262,7 @@
           <a:p>
             <a:fld id="{422181BB-6E71-4556-98B3-F26008078D10}" type="datetime1">
               <a:rPr lang="en-GB" smtClean="0"/>
-              <a:t>30/06/2017</a:t>
+              <a:t>06/07/2017</a:t>
             </a:fld>
             <a:endParaRPr lang="en-GB"/>
           </a:p>
@@ -14132,7 +14242,7 @@
           <a:p>
             <a:fld id="{E25ABBA8-BCDC-4DF1-8C4F-558954363317}" type="datetime1">
               <a:rPr lang="en-GB" smtClean="0"/>
-              <a:t>30/06/2017</a:t>
+              <a:t>06/07/2017</a:t>
             </a:fld>
             <a:endParaRPr lang="en-GB"/>
           </a:p>
@@ -14294,7 +14404,7 @@
           <a:p>
             <a:fld id="{6F668CF4-7B81-4AAB-9B6D-1DFBDDB9A17F}" type="datetime1">
               <a:rPr lang="en-GB" smtClean="0"/>
-              <a:t>30/06/2017</a:t>
+              <a:t>06/07/2017</a:t>
             </a:fld>
             <a:endParaRPr lang="en-GB"/>
           </a:p>
@@ -14738,7 +14848,7 @@
           <a:p>
             <a:fld id="{588DFB3F-48FD-4DD3-8916-5F94F1D461EB}" type="datetime1">
               <a:rPr lang="en-GB" smtClean="0"/>
-              <a:t>30/06/2017</a:t>
+              <a:t>06/07/2017</a:t>
             </a:fld>
             <a:endParaRPr lang="en-GB"/>
           </a:p>
@@ -14889,7 +14999,7 @@
           <a:p>
             <a:fld id="{1F560D75-22DD-4FF3-8BF5-46BBA42C6549}" type="datetime1">
               <a:rPr lang="en-GB" smtClean="0"/>
-              <a:t>30/06/2017</a:t>
+              <a:t>06/07/2017</a:t>
             </a:fld>
             <a:endParaRPr lang="en-GB"/>
           </a:p>
@@ -15040,7 +15150,7 @@
           <a:p>
             <a:fld id="{17F3EC16-58CC-4289-9E3B-FECFD6015B13}" type="datetime1">
               <a:rPr lang="en-GB" smtClean="0"/>
-              <a:t>30/06/2017</a:t>
+              <a:t>06/07/2017</a:t>
             </a:fld>
             <a:endParaRPr lang="en-GB"/>
           </a:p>
@@ -15158,7 +15268,7 @@
           <a:p>
             <a:fld id="{FECF5BDF-79E0-4862-8382-4D401BB22DA8}" type="datetime1">
               <a:rPr lang="en-GB" smtClean="0"/>
-              <a:t>30/06/2017</a:t>
+              <a:t>06/07/2017</a:t>
             </a:fld>
             <a:endParaRPr lang="en-GB"/>
           </a:p>
@@ -15717,7 +15827,7 @@
           <a:p>
             <a:fld id="{91899BFE-3B45-4CE7-8591-B33317569FE6}" type="datetime1">
               <a:rPr lang="en-GB" smtClean="0"/>
-              <a:t>30/06/2017</a:t>
+              <a:t>06/07/2017</a:t>
             </a:fld>
             <a:endParaRPr lang="en-GB"/>
           </a:p>
@@ -16591,7 +16701,7 @@
       </p:sp>
       <p:pic>
         <p:nvPicPr>
-          <p:cNvPr id="3074" name="Picture 2" descr="http://www.free-icons-download.net/images/upload-logo-icon-73898.png"/>
+          <p:cNvPr id="3082" name="Picture 10" descr="Bildergebnis für like"/>
           <p:cNvPicPr>
             <a:picLocks noChangeAspect="1" noChangeArrowheads="1"/>
           </p:cNvPicPr>
@@ -16599,158 +16709,6 @@
         </p:nvPicPr>
         <p:blipFill>
           <a:blip r:embed="rId8" cstate="print">
-            <a:extLst>
-              <a:ext uri="{28A0092B-C50C-407E-A947-70E740481C1C}">
-                <a14:useLocalDpi xmlns:a14="http://schemas.microsoft.com/office/drawing/2010/main" val="0"/>
-              </a:ext>
-            </a:extLst>
-          </a:blip>
-          <a:srcRect/>
-          <a:stretch>
-            <a:fillRect/>
-          </a:stretch>
-        </p:blipFill>
-        <p:spPr bwMode="auto">
-          <a:xfrm>
-            <a:off x="9032953" y="4209467"/>
-            <a:ext cx="1338326" cy="1338326"/>
-          </a:xfrm>
-          <a:prstGeom prst="rect">
-            <a:avLst/>
-          </a:prstGeom>
-          <a:noFill/>
-          <a:extLst>
-            <a:ext uri="{909E8E84-426E-40DD-AFC4-6F175D3DCCD1}">
-              <a14:hiddenFill xmlns:a14="http://schemas.microsoft.com/office/drawing/2010/main">
-                <a:solidFill>
-                  <a:srgbClr val="FFFFFF"/>
-                </a:solidFill>
-              </a14:hiddenFill>
-            </a:ext>
-          </a:extLst>
-        </p:spPr>
-      </p:pic>
-      <p:sp>
-        <p:nvSpPr>
-          <p:cNvPr id="20" name="Textfeld 19"/>
-          <p:cNvSpPr txBox="1"/>
-          <p:nvPr/>
-        </p:nvSpPr>
-        <p:spPr>
-          <a:xfrm>
-            <a:off x="8339403" y="5178461"/>
-            <a:ext cx="2725426" cy="369332"/>
-          </a:xfrm>
-          <a:prstGeom prst="rect">
-            <a:avLst/>
-          </a:prstGeom>
-          <a:noFill/>
-        </p:spPr>
-        <p:txBody>
-          <a:bodyPr wrap="none" rtlCol="0">
-            <a:spAutoFit/>
-          </a:bodyPr>
-          <a:lstStyle/>
-          <a:p>
-            <a:r>
-              <a:rPr lang="de-DE" dirty="0"/>
-              <a:t>Hochgeladene Inhalte</a:t>
-            </a:r>
-          </a:p>
-        </p:txBody>
-      </p:sp>
-      <p:pic>
-        <p:nvPicPr>
-          <p:cNvPr id="3076" name="Picture 4" descr="Bildergebnis für gallery icon"/>
-          <p:cNvPicPr>
-            <a:picLocks noChangeAspect="1" noChangeArrowheads="1"/>
-          </p:cNvPicPr>
-          <p:nvPr/>
-        </p:nvPicPr>
-        <p:blipFill>
-          <a:blip r:embed="rId9">
-            <a:extLst>
-              <a:ext uri="{28A0092B-C50C-407E-A947-70E740481C1C}">
-                <a14:useLocalDpi xmlns:a14="http://schemas.microsoft.com/office/drawing/2010/main" val="0"/>
-              </a:ext>
-            </a:extLst>
-          </a:blip>
-          <a:srcRect/>
-          <a:stretch>
-            <a:fillRect/>
-          </a:stretch>
-        </p:blipFill>
-        <p:spPr bwMode="auto">
-          <a:xfrm>
-            <a:off x="9915117" y="4097128"/>
-            <a:ext cx="912324" cy="912324"/>
-          </a:xfrm>
-          <a:prstGeom prst="rect">
-            <a:avLst/>
-          </a:prstGeom>
-          <a:noFill/>
-          <a:extLst>
-            <a:ext uri="{909E8E84-426E-40DD-AFC4-6F175D3DCCD1}">
-              <a14:hiddenFill xmlns:a14="http://schemas.microsoft.com/office/drawing/2010/main">
-                <a:solidFill>
-                  <a:srgbClr val="FFFFFF"/>
-                </a:solidFill>
-              </a14:hiddenFill>
-            </a:ext>
-          </a:extLst>
-        </p:spPr>
-      </p:pic>
-      <p:pic>
-        <p:nvPicPr>
-          <p:cNvPr id="3080" name="Picture 8" descr="http://icons.iconarchive.com/icons/designbolts/seo/256/Review-Post-icon.png"/>
-          <p:cNvPicPr>
-            <a:picLocks noChangeAspect="1" noChangeArrowheads="1"/>
-          </p:cNvPicPr>
-          <p:nvPr/>
-        </p:nvPicPr>
-        <p:blipFill>
-          <a:blip r:embed="rId10" cstate="print">
-            <a:extLst>
-              <a:ext uri="{28A0092B-C50C-407E-A947-70E740481C1C}">
-                <a14:useLocalDpi xmlns:a14="http://schemas.microsoft.com/office/drawing/2010/main" val="0"/>
-              </a:ext>
-            </a:extLst>
-          </a:blip>
-          <a:srcRect/>
-          <a:stretch>
-            <a:fillRect/>
-          </a:stretch>
-        </p:blipFill>
-        <p:spPr bwMode="auto">
-          <a:xfrm>
-            <a:off x="8657537" y="4210892"/>
-            <a:ext cx="723007" cy="723007"/>
-          </a:xfrm>
-          <a:prstGeom prst="rect">
-            <a:avLst/>
-          </a:prstGeom>
-          <a:noFill/>
-          <a:extLst>
-            <a:ext uri="{909E8E84-426E-40DD-AFC4-6F175D3DCCD1}">
-              <a14:hiddenFill xmlns:a14="http://schemas.microsoft.com/office/drawing/2010/main">
-                <a:solidFill>
-                  <a:srgbClr val="FFFFFF"/>
-                </a:solidFill>
-              </a14:hiddenFill>
-            </a:ext>
-          </a:extLst>
-        </p:spPr>
-      </p:pic>
-      <p:pic>
-        <p:nvPicPr>
-          <p:cNvPr id="3082" name="Picture 10" descr="Bildergebnis für like"/>
-          <p:cNvPicPr>
-            <a:picLocks noChangeAspect="1" noChangeArrowheads="1"/>
-          </p:cNvPicPr>
-          <p:nvPr/>
-        </p:nvPicPr>
-        <p:blipFill>
-          <a:blip r:embed="rId11" cstate="print">
             <a:extLst>
               <a:ext uri="{28A0092B-C50C-407E-A947-70E740481C1C}">
                 <a14:useLocalDpi xmlns:a14="http://schemas.microsoft.com/office/drawing/2010/main" val="0"/>
@@ -16828,7 +16786,7 @@
           <a:p>
             <a:fld id="{0116998B-1528-4B9A-8F24-6E87C29EE8E7}" type="datetime1">
               <a:rPr lang="en-GB" smtClean="0"/>
-              <a:t>30/06/2017</a:t>
+              <a:t>06/07/2017</a:t>
             </a:fld>
             <a:endParaRPr lang="en-GB"/>
           </a:p>
@@ -16857,6 +16815,158 @@
           </a:p>
         </p:txBody>
       </p:sp>
+      <p:pic>
+        <p:nvPicPr>
+          <p:cNvPr id="22" name="Picture 2" descr="http://www.free-icons-download.net/images/upload-logo-icon-73898.png"/>
+          <p:cNvPicPr>
+            <a:picLocks noChangeAspect="1" noChangeArrowheads="1"/>
+          </p:cNvPicPr>
+          <p:nvPr/>
+        </p:nvPicPr>
+        <p:blipFill>
+          <a:blip r:embed="rId9" cstate="print">
+            <a:extLst>
+              <a:ext uri="{28A0092B-C50C-407E-A947-70E740481C1C}">
+                <a14:useLocalDpi xmlns:a14="http://schemas.microsoft.com/office/drawing/2010/main" val="0"/>
+              </a:ext>
+            </a:extLst>
+          </a:blip>
+          <a:srcRect/>
+          <a:stretch>
+            <a:fillRect/>
+          </a:stretch>
+        </p:blipFill>
+        <p:spPr bwMode="auto">
+          <a:xfrm>
+            <a:off x="8753062" y="4317803"/>
+            <a:ext cx="1338326" cy="1338326"/>
+          </a:xfrm>
+          <a:prstGeom prst="rect">
+            <a:avLst/>
+          </a:prstGeom>
+          <a:noFill/>
+          <a:extLst>
+            <a:ext uri="{909E8E84-426E-40DD-AFC4-6F175D3DCCD1}">
+              <a14:hiddenFill xmlns:a14="http://schemas.microsoft.com/office/drawing/2010/main">
+                <a:solidFill>
+                  <a:srgbClr val="FFFFFF"/>
+                </a:solidFill>
+              </a14:hiddenFill>
+            </a:ext>
+          </a:extLst>
+        </p:spPr>
+      </p:pic>
+      <p:sp>
+        <p:nvSpPr>
+          <p:cNvPr id="23" name="Textfeld 22"/>
+          <p:cNvSpPr txBox="1"/>
+          <p:nvPr/>
+        </p:nvSpPr>
+        <p:spPr>
+          <a:xfrm>
+            <a:off x="8059512" y="5286797"/>
+            <a:ext cx="2725426" cy="369332"/>
+          </a:xfrm>
+          <a:prstGeom prst="rect">
+            <a:avLst/>
+          </a:prstGeom>
+          <a:noFill/>
+        </p:spPr>
+        <p:txBody>
+          <a:bodyPr wrap="none" rtlCol="0">
+            <a:spAutoFit/>
+          </a:bodyPr>
+          <a:lstStyle/>
+          <a:p>
+            <a:r>
+              <a:rPr lang="de-DE" dirty="0"/>
+              <a:t>Hochgeladene Inhalte</a:t>
+            </a:r>
+          </a:p>
+        </p:txBody>
+      </p:sp>
+      <p:pic>
+        <p:nvPicPr>
+          <p:cNvPr id="24" name="Picture 4" descr="Bildergebnis für gallery icon"/>
+          <p:cNvPicPr>
+            <a:picLocks noChangeAspect="1" noChangeArrowheads="1"/>
+          </p:cNvPicPr>
+          <p:nvPr/>
+        </p:nvPicPr>
+        <p:blipFill>
+          <a:blip r:embed="rId10">
+            <a:extLst>
+              <a:ext uri="{28A0092B-C50C-407E-A947-70E740481C1C}">
+                <a14:useLocalDpi xmlns:a14="http://schemas.microsoft.com/office/drawing/2010/main" val="0"/>
+              </a:ext>
+            </a:extLst>
+          </a:blip>
+          <a:srcRect/>
+          <a:stretch>
+            <a:fillRect/>
+          </a:stretch>
+        </p:blipFill>
+        <p:spPr bwMode="auto">
+          <a:xfrm>
+            <a:off x="9635226" y="4205464"/>
+            <a:ext cx="912324" cy="912324"/>
+          </a:xfrm>
+          <a:prstGeom prst="rect">
+            <a:avLst/>
+          </a:prstGeom>
+          <a:noFill/>
+          <a:extLst>
+            <a:ext uri="{909E8E84-426E-40DD-AFC4-6F175D3DCCD1}">
+              <a14:hiddenFill xmlns:a14="http://schemas.microsoft.com/office/drawing/2010/main">
+                <a:solidFill>
+                  <a:srgbClr val="FFFFFF"/>
+                </a:solidFill>
+              </a14:hiddenFill>
+            </a:ext>
+          </a:extLst>
+        </p:spPr>
+      </p:pic>
+      <p:pic>
+        <p:nvPicPr>
+          <p:cNvPr id="26" name="Picture 8" descr="http://icons.iconarchive.com/icons/designbolts/seo/256/Review-Post-icon.png"/>
+          <p:cNvPicPr>
+            <a:picLocks noChangeAspect="1" noChangeArrowheads="1"/>
+          </p:cNvPicPr>
+          <p:nvPr/>
+        </p:nvPicPr>
+        <p:blipFill>
+          <a:blip r:embed="rId11" cstate="print">
+            <a:extLst>
+              <a:ext uri="{28A0092B-C50C-407E-A947-70E740481C1C}">
+                <a14:useLocalDpi xmlns:a14="http://schemas.microsoft.com/office/drawing/2010/main" val="0"/>
+              </a:ext>
+            </a:extLst>
+          </a:blip>
+          <a:srcRect/>
+          <a:stretch>
+            <a:fillRect/>
+          </a:stretch>
+        </p:blipFill>
+        <p:spPr bwMode="auto">
+          <a:xfrm>
+            <a:off x="8377646" y="4319228"/>
+            <a:ext cx="723007" cy="723007"/>
+          </a:xfrm>
+          <a:prstGeom prst="rect">
+            <a:avLst/>
+          </a:prstGeom>
+          <a:noFill/>
+          <a:extLst>
+            <a:ext uri="{909E8E84-426E-40DD-AFC4-6F175D3DCCD1}">
+              <a14:hiddenFill xmlns:a14="http://schemas.microsoft.com/office/drawing/2010/main">
+                <a:solidFill>
+                  <a:srgbClr val="FFFFFF"/>
+                </a:solidFill>
+              </a14:hiddenFill>
+            </a:ext>
+          </a:extLst>
+        </p:spPr>
+      </p:pic>
     </p:spTree>
     <p:extLst>
       <p:ext uri="{BB962C8B-B14F-4D97-AF65-F5344CB8AC3E}">
@@ -16901,7 +17011,7 @@
                                           </p:stCondLst>
                                         </p:cTn>
                                         <p:tgtEl>
-                                          <p:spTgt spid="3074"/>
+                                          <p:spTgt spid="22"/>
                                         </p:tgtEl>
                                         <p:attrNameLst>
                                           <p:attrName>style.visibility</p:attrName>
@@ -16928,7 +17038,7 @@
                                           </p:stCondLst>
                                         </p:cTn>
                                         <p:tgtEl>
-                                          <p:spTgt spid="20"/>
+                                          <p:spTgt spid="23"/>
                                         </p:tgtEl>
                                         <p:attrNameLst>
                                           <p:attrName>style.visibility</p:attrName>
@@ -16955,7 +17065,7 @@
                                           </p:stCondLst>
                                         </p:cTn>
                                         <p:tgtEl>
-                                          <p:spTgt spid="3076"/>
+                                          <p:spTgt spid="24"/>
                                         </p:tgtEl>
                                         <p:attrNameLst>
                                           <p:attrName>style.visibility</p:attrName>
@@ -16982,7 +17092,7 @@
                                           </p:stCondLst>
                                         </p:cTn>
                                         <p:tgtEl>
-                                          <p:spTgt spid="3080"/>
+                                          <p:spTgt spid="26"/>
                                         </p:tgtEl>
                                         <p:attrNameLst>
                                           <p:attrName>style.visibility</p:attrName>
@@ -17095,8 +17205,8 @@
       </p:par>
     </p:tnLst>
     <p:bldLst>
-      <p:bldP spid="20" grpId="0"/>
       <p:bldP spid="25" grpId="0"/>
+      <p:bldP spid="23" grpId="0"/>
     </p:bldLst>
   </p:timing>
 </p:sld>
@@ -17186,7 +17296,7 @@
           <a:p>
             <a:fld id="{1F9C837C-6D7E-4F62-A2D0-19997C52C3FA}" type="datetime1">
               <a:rPr lang="en-GB" smtClean="0"/>
-              <a:t>30/06/2017</a:t>
+              <a:t>06/07/2017</a:t>
             </a:fld>
             <a:endParaRPr lang="en-GB"/>
           </a:p>
@@ -17827,7 +17937,7 @@
           <a:p>
             <a:fld id="{B2105120-77FB-48E3-8DEB-945ED491BC14}" type="datetime1">
               <a:rPr lang="en-GB" smtClean="0"/>
-              <a:t>30/06/2017</a:t>
+              <a:t>06/07/2017</a:t>
             </a:fld>
             <a:endParaRPr lang="en-GB"/>
           </a:p>

</xml_diff>